<commit_message>
added Uni Logo Copyright
</commit_message>
<xml_diff>
--- a/lectures/01_introduction/01_introduction.pptx
+++ b/lectures/01_introduction/01_introduction.pptx
@@ -150,7 +150,7 @@
 <file path=ppt/revisionInfo.xml><?xml version="1.0" encoding="utf-8"?>
 <p1510:revInfo xmlns:a="http://schemas.openxmlformats.org/drawingml/2006/main" xmlns:r="http://schemas.openxmlformats.org/officeDocument/2006/relationships" xmlns:p1510="http://schemas.microsoft.com/office/powerpoint/2015/10/main">
   <p1510:revLst>
-    <p1510:client id="{680AE06E-83A3-2ECA-1879-53C7F6B8E822}" v="189" dt="2025-05-18T11:36:30.887"/>
+    <p1510:client id="{F61F8AF2-7A81-BA7B-BBCE-58636BD26F6F}" v="104" dt="2025-05-23T15:31:09.548"/>
   </p1510:revLst>
 </p1510:revInfo>
 </file>
@@ -37892,7 +37892,52 @@
               </a:buClr>
               <a:buNone/>
             </a:pPr>
-            <a:endParaRPr lang="en-GB" sz="2000" b="0" strike="noStrike" spc="-1" dirty="0">
+            <a:r>
+              <a:rPr lang="en-GB" sz="2000" spc="-1" dirty="0">
+                <a:solidFill>
+                  <a:srgbClr val="003056"/>
+                </a:solidFill>
+                <a:latin typeface="Calibri"/>
+              </a:rPr>
+              <a:t>                                                                                                                                                                                  © University of Mannheim</a:t>
+            </a:r>
+            <a:endParaRPr lang="en-GB" dirty="0"/>
+          </a:p>
+          <a:p>
+            <a:pPr marL="0" indent="0">
+              <a:lnSpc>
+                <a:spcPct val="100000"/>
+              </a:lnSpc>
+              <a:spcBef>
+                <a:spcPts val="400"/>
+              </a:spcBef>
+              <a:buClr>
+                <a:srgbClr val="003056"/>
+              </a:buClr>
+              <a:buFont typeface="Arial" panose="020B0604020202020204" pitchFamily="34" charset="0"/>
+              <a:buNone/>
+            </a:pPr>
+            <a:endParaRPr lang="en-GB" sz="2000" spc="-1" dirty="0">
+              <a:solidFill>
+                <a:srgbClr val="003056"/>
+              </a:solidFill>
+              <a:latin typeface="Calibri"/>
+            </a:endParaRPr>
+          </a:p>
+          <a:p>
+            <a:pPr marL="0" indent="0">
+              <a:lnSpc>
+                <a:spcPct val="100000"/>
+              </a:lnSpc>
+              <a:spcBef>
+                <a:spcPts val="400"/>
+              </a:spcBef>
+              <a:buClr>
+                <a:srgbClr val="003056"/>
+              </a:buClr>
+              <a:buNone/>
+            </a:pPr>
+            <a:endParaRPr lang="en-GB" sz="2000" spc="-1" dirty="0">
               <a:solidFill>
                 <a:srgbClr val="003056"/>
               </a:solidFill>
@@ -37923,6 +37968,36 @@
           </a:p>
         </p:txBody>
       </p:sp>
+      <p:pic>
+        <p:nvPicPr>
+          <p:cNvPr id="2" name="Picture 1" descr="A logo for a university&#10;&#10;AI-generated content may be incorrect.">
+            <a:extLst>
+              <a:ext uri="{FF2B5EF4-FFF2-40B4-BE49-F238E27FC236}">
+                <a16:creationId xmlns:a16="http://schemas.microsoft.com/office/drawing/2014/main" id="{B8E2BA09-6473-FFED-A799-3BB78D0D3D1D}"/>
+              </a:ext>
+            </a:extLst>
+          </p:cNvPr>
+          <p:cNvPicPr>
+            <a:picLocks noChangeAspect="1"/>
+          </p:cNvPicPr>
+          <p:nvPr/>
+        </p:nvPicPr>
+        <p:blipFill>
+          <a:blip r:embed="rId2"/>
+          <a:stretch>
+            <a:fillRect/>
+          </a:stretch>
+        </p:blipFill>
+        <p:spPr>
+          <a:xfrm>
+            <a:off x="974911" y="2231505"/>
+            <a:ext cx="2000250" cy="932624"/>
+          </a:xfrm>
+          <a:prstGeom prst="rect">
+            <a:avLst/>
+          </a:prstGeom>
+        </p:spPr>
+      </p:pic>
     </p:spTree>
   </p:cSld>
   <p:clrMapOvr>
@@ -38069,6 +38144,49 @@
                                           <p:spTgt spid="207">
                                             <p:txEl>
                                               <p:pRg st="2" end="2"/>
+                                            </p:txEl>
+                                          </p:spTgt>
+                                        </p:tgtEl>
+                                      </p:cBhvr>
+                                    </p:animEffect>
+                                  </p:childTnLst>
+                                </p:cTn>
+                              </p:par>
+                              <p:par>
+                                <p:cTn id="14" presetID="22" presetClass="entr" presetSubtype="4" fill="hold" nodeType="withEffect">
+                                  <p:stCondLst>
+                                    <p:cond delay="0"/>
+                                  </p:stCondLst>
+                                  <p:childTnLst>
+                                    <p:set>
+                                      <p:cBhvr>
+                                        <p:cTn id="15" dur="1" fill="hold">
+                                          <p:stCondLst>
+                                            <p:cond delay="0"/>
+                                          </p:stCondLst>
+                                        </p:cTn>
+                                        <p:tgtEl>
+                                          <p:spTgt spid="207">
+                                            <p:txEl>
+                                              <p:pRg st="3" end="3"/>
+                                            </p:txEl>
+                                          </p:spTgt>
+                                        </p:tgtEl>
+                                        <p:attrNameLst>
+                                          <p:attrName>style.visibility</p:attrName>
+                                        </p:attrNameLst>
+                                      </p:cBhvr>
+                                      <p:to>
+                                        <p:strVal val="visible"/>
+                                      </p:to>
+                                    </p:set>
+                                    <p:animEffect transition="in" filter="wipe(down)">
+                                      <p:cBhvr additive="repl">
+                                        <p:cTn id="16" dur="500"/>
+                                        <p:tgtEl>
+                                          <p:spTgt spid="207">
+                                            <p:txEl>
+                                              <p:pRg st="3" end="3"/>
                                             </p:txEl>
                                           </p:spTgt>
                                         </p:tgtEl>

</xml_diff>